<commit_message>
updated script and template to accommodate new JSON output from MS Flow
Signed-off-by: Tom Twyman <ttwyman@vmware.com>
</commit_message>
<xml_diff>
--- a/sample.pptx
+++ b/sample.pptx
@@ -2973,7 +2973,7 @@
               <a:rPr lang="en-US" smtClean="0">
                 <a:latin typeface="Metropolis" panose="00000500000000000000" pitchFamily="50" charset="0"/>
               </a:rPr>
-              <a:t>4/7/22</a:t>
+              <a:t>10/11/22</a:t>
             </a:fld>
             <a:endParaRPr lang="en-US">
               <a:latin typeface="Metropolis" panose="00000500000000000000" pitchFamily="50" charset="0"/>
@@ -3182,7 +3182,7 @@
             <a:fld id="{3CB6F0DB-E055-41D0-9102-627A646E4242}" type="datetimeFigureOut">
               <a:rPr lang="en-US" smtClean="0"/>
               <a:pPr/>
-              <a:t>4/7/22</a:t>
+              <a:t>10/11/22</a:t>
             </a:fld>
             <a:endParaRPr lang="en-US"/>
           </a:p>
@@ -4338,7 +4338,7 @@
             </a:ln>
             <a:extLst>
               <a:ext uri="{91240B29-F687-4f45-9708-019B960494DF}">
-                <a14:hiddenLine xmlns="" xmlns:a14="http://schemas.microsoft.com/office/drawing/2010/main" w="9525">
+                <a14:hiddenLine xmlns:a14="http://schemas.microsoft.com/office/drawing/2010/main" xmlns="" w="9525">
                   <a:solidFill>
                     <a:srgbClr val="000000"/>
                   </a:solidFill>
@@ -4520,7 +4520,7 @@
             </a:ln>
             <a:extLst>
               <a:ext uri="{91240B29-F687-4f45-9708-019B960494DF}">
-                <a14:hiddenLine xmlns="" xmlns:a14="http://schemas.microsoft.com/office/drawing/2010/main" w="9525">
+                <a14:hiddenLine xmlns:a14="http://schemas.microsoft.com/office/drawing/2010/main" xmlns="" w="9525">
                   <a:solidFill>
                     <a:srgbClr val="000000"/>
                   </a:solidFill>
@@ -4750,7 +4750,7 @@
             </a:ln>
             <a:extLst>
               <a:ext uri="{91240B29-F687-4f45-9708-019B960494DF}">
-                <a14:hiddenLine xmlns="" xmlns:a14="http://schemas.microsoft.com/office/drawing/2010/main" w="9525">
+                <a14:hiddenLine xmlns:a14="http://schemas.microsoft.com/office/drawing/2010/main" xmlns="" w="9525">
                   <a:solidFill>
                     <a:srgbClr val="000000"/>
                   </a:solidFill>
@@ -5071,7 +5071,7 @@
             </a:ln>
             <a:extLst>
               <a:ext uri="{91240B29-F687-4f45-9708-019B960494DF}">
-                <a14:hiddenLine xmlns="" xmlns:a14="http://schemas.microsoft.com/office/drawing/2010/main" w="9525">
+                <a14:hiddenLine xmlns:a14="http://schemas.microsoft.com/office/drawing/2010/main" xmlns="" w="9525">
                   <a:solidFill>
                     <a:srgbClr val="000000"/>
                   </a:solidFill>
@@ -5463,7 +5463,7 @@
             </a:ln>
             <a:extLst>
               <a:ext uri="{91240B29-F687-4f45-9708-019B960494DF}">
-                <a14:hiddenLine xmlns="" xmlns:a14="http://schemas.microsoft.com/office/drawing/2010/main" w="9525">
+                <a14:hiddenLine xmlns:a14="http://schemas.microsoft.com/office/drawing/2010/main" xmlns="" w="9525">
                   <a:solidFill>
                     <a:srgbClr val="000000"/>
                   </a:solidFill>
@@ -5664,7 +5664,7 @@
             </a:ln>
             <a:extLst>
               <a:ext uri="{91240B29-F687-4f45-9708-019B960494DF}">
-                <a14:hiddenLine xmlns="" xmlns:a14="http://schemas.microsoft.com/office/drawing/2010/main" w="9525">
+                <a14:hiddenLine xmlns:a14="http://schemas.microsoft.com/office/drawing/2010/main" xmlns="" w="9525">
                   <a:solidFill>
                     <a:srgbClr val="000000"/>
                   </a:solidFill>
@@ -5963,7 +5963,7 @@
             </a:ln>
             <a:extLst>
               <a:ext uri="{91240B29-F687-4f45-9708-019B960494DF}">
-                <a14:hiddenLine xmlns="" xmlns:a14="http://schemas.microsoft.com/office/drawing/2010/main" w="9525">
+                <a14:hiddenLine xmlns:a14="http://schemas.microsoft.com/office/drawing/2010/main" xmlns="" w="9525">
                   <a:solidFill>
                     <a:srgbClr val="000000"/>
                   </a:solidFill>
@@ -6620,7 +6620,7 @@
             </a:ln>
             <a:extLst>
               <a:ext uri="{91240B29-F687-4f45-9708-019B960494DF}">
-                <a14:hiddenLine xmlns="" xmlns:a14="http://schemas.microsoft.com/office/drawing/2010/main" w="9525">
+                <a14:hiddenLine xmlns:a14="http://schemas.microsoft.com/office/drawing/2010/main" xmlns="" w="9525">
                   <a:solidFill>
                     <a:srgbClr val="000000"/>
                   </a:solidFill>
@@ -6801,7 +6801,7 @@
             </a:ln>
             <a:extLst>
               <a:ext uri="{91240B29-F687-4f45-9708-019B960494DF}">
-                <a14:hiddenLine xmlns="" xmlns:a14="http://schemas.microsoft.com/office/drawing/2010/main" w="9525">
+                <a14:hiddenLine xmlns:a14="http://schemas.microsoft.com/office/drawing/2010/main" xmlns="" w="9525">
                   <a:solidFill>
                     <a:srgbClr val="000000"/>
                   </a:solidFill>
@@ -7030,7 +7030,7 @@
             </a:ln>
             <a:extLst>
               <a:ext uri="{91240B29-F687-4f45-9708-019B960494DF}">
-                <a14:hiddenLine xmlns="" xmlns:a14="http://schemas.microsoft.com/office/drawing/2010/main" w="9525">
+                <a14:hiddenLine xmlns:a14="http://schemas.microsoft.com/office/drawing/2010/main" xmlns="" w="9525">
                   <a:solidFill>
                     <a:srgbClr val="000000"/>
                   </a:solidFill>
@@ -7350,7 +7350,7 @@
             </a:ln>
             <a:extLst>
               <a:ext uri="{91240B29-F687-4f45-9708-019B960494DF}">
-                <a14:hiddenLine xmlns="" xmlns:a14="http://schemas.microsoft.com/office/drawing/2010/main" w="9525">
+                <a14:hiddenLine xmlns:a14="http://schemas.microsoft.com/office/drawing/2010/main" xmlns="" w="9525">
                   <a:solidFill>
                     <a:srgbClr val="000000"/>
                   </a:solidFill>
@@ -7741,7 +7741,7 @@
             </a:ln>
             <a:extLst>
               <a:ext uri="{91240B29-F687-4f45-9708-019B960494DF}">
-                <a14:hiddenLine xmlns="" xmlns:a14="http://schemas.microsoft.com/office/drawing/2010/main" w="9525">
+                <a14:hiddenLine xmlns:a14="http://schemas.microsoft.com/office/drawing/2010/main" xmlns="" w="9525">
                   <a:solidFill>
                     <a:srgbClr val="000000"/>
                   </a:solidFill>
@@ -7941,7 +7941,7 @@
             </a:ln>
             <a:extLst>
               <a:ext uri="{91240B29-F687-4f45-9708-019B960494DF}">
-                <a14:hiddenLine xmlns="" xmlns:a14="http://schemas.microsoft.com/office/drawing/2010/main" w="9525">
+                <a14:hiddenLine xmlns:a14="http://schemas.microsoft.com/office/drawing/2010/main" xmlns="" w="9525">
                   <a:solidFill>
                     <a:srgbClr val="000000"/>
                   </a:solidFill>
@@ -8239,7 +8239,7 @@
             </a:ln>
             <a:extLst>
               <a:ext uri="{91240B29-F687-4f45-9708-019B960494DF}">
-                <a14:hiddenLine xmlns="" xmlns:a14="http://schemas.microsoft.com/office/drawing/2010/main" w="9525">
+                <a14:hiddenLine xmlns:a14="http://schemas.microsoft.com/office/drawing/2010/main" xmlns="" w="9525">
                   <a:solidFill>
                     <a:srgbClr val="000000"/>
                   </a:solidFill>
@@ -10127,7 +10127,7 @@
             </a:ln>
             <a:extLst>
               <a:ext uri="{91240B29-F687-4f45-9708-019B960494DF}">
-                <a14:hiddenLine xmlns="" xmlns:a14="http://schemas.microsoft.com/office/drawing/2010/main" w="9525">
+                <a14:hiddenLine xmlns:a14="http://schemas.microsoft.com/office/drawing/2010/main" xmlns="" w="9525">
                   <a:solidFill>
                     <a:srgbClr val="000000"/>
                   </a:solidFill>
@@ -10306,7 +10306,7 @@
             </a:ln>
             <a:extLst>
               <a:ext uri="{91240B29-F687-4f45-9708-019B960494DF}">
-                <a14:hiddenLine xmlns="" xmlns:a14="http://schemas.microsoft.com/office/drawing/2010/main" w="9525">
+                <a14:hiddenLine xmlns:a14="http://schemas.microsoft.com/office/drawing/2010/main" xmlns="" w="9525">
                   <a:solidFill>
                     <a:srgbClr val="000000"/>
                   </a:solidFill>
@@ -10533,7 +10533,7 @@
             </a:ln>
             <a:extLst>
               <a:ext uri="{91240B29-F687-4f45-9708-019B960494DF}">
-                <a14:hiddenLine xmlns="" xmlns:a14="http://schemas.microsoft.com/office/drawing/2010/main" w="9525">
+                <a14:hiddenLine xmlns:a14="http://schemas.microsoft.com/office/drawing/2010/main" xmlns="" w="9525">
                   <a:solidFill>
                     <a:srgbClr val="000000"/>
                   </a:solidFill>
@@ -10851,7 +10851,7 @@
             </a:ln>
             <a:extLst>
               <a:ext uri="{91240B29-F687-4f45-9708-019B960494DF}">
-                <a14:hiddenLine xmlns="" xmlns:a14="http://schemas.microsoft.com/office/drawing/2010/main" w="9525">
+                <a14:hiddenLine xmlns:a14="http://schemas.microsoft.com/office/drawing/2010/main" xmlns="" w="9525">
                   <a:solidFill>
                     <a:srgbClr val="000000"/>
                   </a:solidFill>
@@ -11240,7 +11240,7 @@
             </a:ln>
             <a:extLst>
               <a:ext uri="{91240B29-F687-4f45-9708-019B960494DF}">
-                <a14:hiddenLine xmlns="" xmlns:a14="http://schemas.microsoft.com/office/drawing/2010/main" w="9525">
+                <a14:hiddenLine xmlns:a14="http://schemas.microsoft.com/office/drawing/2010/main" xmlns="" w="9525">
                   <a:solidFill>
                     <a:srgbClr val="000000"/>
                   </a:solidFill>
@@ -11438,7 +11438,7 @@
             </a:ln>
             <a:extLst>
               <a:ext uri="{91240B29-F687-4f45-9708-019B960494DF}">
-                <a14:hiddenLine xmlns="" xmlns:a14="http://schemas.microsoft.com/office/drawing/2010/main" w="9525">
+                <a14:hiddenLine xmlns:a14="http://schemas.microsoft.com/office/drawing/2010/main" xmlns="" w="9525">
                   <a:solidFill>
                     <a:srgbClr val="000000"/>
                   </a:solidFill>
@@ -11734,7 +11734,7 @@
             </a:ln>
             <a:extLst>
               <a:ext uri="{91240B29-F687-4f45-9708-019B960494DF}">
-                <a14:hiddenLine xmlns="" xmlns:a14="http://schemas.microsoft.com/office/drawing/2010/main" w="9525">
+                <a14:hiddenLine xmlns:a14="http://schemas.microsoft.com/office/drawing/2010/main" xmlns="" w="9525">
                   <a:solidFill>
                     <a:srgbClr val="000000"/>
                   </a:solidFill>
@@ -12584,7 +12584,7 @@
             </a:ln>
             <a:extLst>
               <a:ext uri="{91240B29-F687-4f45-9708-019B960494DF}">
-                <a14:hiddenLine xmlns="" xmlns:a14="http://schemas.microsoft.com/office/drawing/2010/main" w="9525">
+                <a14:hiddenLine xmlns:a14="http://schemas.microsoft.com/office/drawing/2010/main" xmlns="" w="9525">
                   <a:solidFill>
                     <a:srgbClr val="000000"/>
                   </a:solidFill>
@@ -12765,7 +12765,7 @@
             </a:ln>
             <a:extLst>
               <a:ext uri="{91240B29-F687-4f45-9708-019B960494DF}">
-                <a14:hiddenLine xmlns="" xmlns:a14="http://schemas.microsoft.com/office/drawing/2010/main" w="9525">
+                <a14:hiddenLine xmlns:a14="http://schemas.microsoft.com/office/drawing/2010/main" xmlns="" w="9525">
                   <a:solidFill>
                     <a:srgbClr val="000000"/>
                   </a:solidFill>
@@ -12994,7 +12994,7 @@
             </a:ln>
             <a:extLst>
               <a:ext uri="{91240B29-F687-4f45-9708-019B960494DF}">
-                <a14:hiddenLine xmlns="" xmlns:a14="http://schemas.microsoft.com/office/drawing/2010/main" w="9525">
+                <a14:hiddenLine xmlns:a14="http://schemas.microsoft.com/office/drawing/2010/main" xmlns="" w="9525">
                   <a:solidFill>
                     <a:srgbClr val="000000"/>
                   </a:solidFill>
@@ -13314,7 +13314,7 @@
             </a:ln>
             <a:extLst>
               <a:ext uri="{91240B29-F687-4f45-9708-019B960494DF}">
-                <a14:hiddenLine xmlns="" xmlns:a14="http://schemas.microsoft.com/office/drawing/2010/main" w="9525">
+                <a14:hiddenLine xmlns:a14="http://schemas.microsoft.com/office/drawing/2010/main" xmlns="" w="9525">
                   <a:solidFill>
                     <a:srgbClr val="000000"/>
                   </a:solidFill>
@@ -13705,7 +13705,7 @@
             </a:ln>
             <a:extLst>
               <a:ext uri="{91240B29-F687-4f45-9708-019B960494DF}">
-                <a14:hiddenLine xmlns="" xmlns:a14="http://schemas.microsoft.com/office/drawing/2010/main" w="9525">
+                <a14:hiddenLine xmlns:a14="http://schemas.microsoft.com/office/drawing/2010/main" xmlns="" w="9525">
                   <a:solidFill>
                     <a:srgbClr val="000000"/>
                   </a:solidFill>
@@ -13905,7 +13905,7 @@
             </a:ln>
             <a:extLst>
               <a:ext uri="{91240B29-F687-4f45-9708-019B960494DF}">
-                <a14:hiddenLine xmlns="" xmlns:a14="http://schemas.microsoft.com/office/drawing/2010/main" w="9525">
+                <a14:hiddenLine xmlns:a14="http://schemas.microsoft.com/office/drawing/2010/main" xmlns="" w="9525">
                   <a:solidFill>
                     <a:srgbClr val="000000"/>
                   </a:solidFill>
@@ -14203,7 +14203,7 @@
             </a:ln>
             <a:extLst>
               <a:ext uri="{91240B29-F687-4f45-9708-019B960494DF}">
-                <a14:hiddenLine xmlns="" xmlns:a14="http://schemas.microsoft.com/office/drawing/2010/main" w="9525">
+                <a14:hiddenLine xmlns:a14="http://schemas.microsoft.com/office/drawing/2010/main" xmlns="" w="9525">
                   <a:solidFill>
                     <a:srgbClr val="000000"/>
                   </a:solidFill>
@@ -15033,7 +15033,7 @@
           <a:p>
             <a:fld id="{4E5E5D2B-AE30-B645-9F96-F189017CC82B}" type="datetime4">
               <a:rPr lang="en-US" smtClean="0"/>
-              <a:t>April 7, 2022</a:t>
+              <a:t>October 11, 2022</a:t>
             </a:fld>
             <a:endParaRPr lang="en-US" dirty="0"/>
           </a:p>
@@ -15097,14 +15097,14 @@
             <p:ph sz="quarter" idx="14"/>
             <p:extLst>
               <p:ext uri="{D42A27DB-BD31-4B8C-83A1-F6EECF244321}">
-                <p14:modId xmlns:p14="http://schemas.microsoft.com/office/powerpoint/2010/main" val="3362277453"/>
+                <p14:modId xmlns:p14="http://schemas.microsoft.com/office/powerpoint/2010/main" val="3393962144"/>
               </p:ext>
             </p:extLst>
           </p:nvPr>
         </p:nvGraphicFramePr>
         <p:xfrm>
           <a:off x="615950" y="1600200"/>
-          <a:ext cx="10972800" cy="2225040"/>
+          <a:ext cx="10972800" cy="2595880"/>
         </p:xfrm>
         <a:graphic>
           <a:graphicData uri="http://schemas.openxmlformats.org/drawingml/2006/table">
@@ -15225,12 +15225,8 @@
                     <a:lstStyle/>
                     <a:p>
                       <a:r>
-                        <a:rPr lang="en-US"/>
-                        <a:t>VMware Solutions </a:t>
-                      </a:r>
-                      <a:r>
                         <a:rPr lang="en-US" dirty="0"/>
-                        <a:t>Architect</a:t>
+                        <a:t>VMware Solution Architect</a:t>
                       </a:r>
                     </a:p>
                   </a:txBody>
@@ -15307,7 +15303,7 @@
                       </a:pPr>
                       <a:r>
                         <a:rPr lang="en-US" dirty="0"/>
-                        <a:t>Solutions in scope</a:t>
+                        <a:t>Solution in scope</a:t>
                       </a:r>
                     </a:p>
                   </a:txBody>
@@ -15326,6 +15322,53 @@
                 <a:extLst>
                   <a:ext uri="{0D108BD9-81ED-4DB2-BD59-A6C34878D82A}">
                     <a16:rowId xmlns:a16="http://schemas.microsoft.com/office/drawing/2014/main" val="1530967400"/>
+                  </a:ext>
+                </a:extLst>
+              </a:tr>
+              <a:tr h="370840">
+                <a:tc>
+                  <a:txBody>
+                    <a:bodyPr/>
+                    <a:lstStyle/>
+                    <a:p>
+                      <a:pPr marL="0" marR="0" lvl="0" indent="0" algn="l" defTabSz="914400" rtl="0" eaLnBrk="1" fontAlgn="auto" latinLnBrk="0" hangingPunct="1">
+                        <a:lnSpc>
+                          <a:spcPct val="100000"/>
+                        </a:lnSpc>
+                        <a:spcBef>
+                          <a:spcPts val="0"/>
+                        </a:spcBef>
+                        <a:spcAft>
+                          <a:spcPts val="0"/>
+                        </a:spcAft>
+                        <a:buClrTx/>
+                        <a:buSzTx/>
+                        <a:buFontTx/>
+                        <a:buNone/>
+                        <a:tabLst/>
+                        <a:defRPr/>
+                      </a:pPr>
+                      <a:r>
+                        <a:rPr lang="en-US" dirty="0"/>
+                        <a:t>Additional services</a:t>
+                      </a:r>
+                    </a:p>
+                  </a:txBody>
+                  <a:tcPr/>
+                </a:tc>
+                <a:tc>
+                  <a:txBody>
+                    <a:bodyPr/>
+                    <a:lstStyle/>
+                    <a:p>
+                      <a:endParaRPr lang="en-US" dirty="0"/>
+                    </a:p>
+                  </a:txBody>
+                  <a:tcPr/>
+                </a:tc>
+                <a:extLst>
+                  <a:ext uri="{0D108BD9-81ED-4DB2-BD59-A6C34878D82A}">
+                    <a16:rowId xmlns:a16="http://schemas.microsoft.com/office/drawing/2014/main" val="3884746843"/>
                   </a:ext>
                 </a:extLst>
               </a:tr>

</xml_diff>